<commit_message>
Added titles to all sections
</commit_message>
<xml_diff>
--- a/01-building_cookbooks_with_tests.pptx
+++ b/01-building_cookbooks_with_tests.pptx
@@ -9412,6 +9412,13 @@
   <p:transition xmlns:p14="http://schemas.microsoft.com/office/powerpoint/2010/main" spd="med">
     <p:fade/>
   </p:transition>
+  <p:timing>
+    <p:tnLst>
+      <p:par>
+        <p:cTn xmlns:p14="http://schemas.microsoft.com/office/powerpoint/2010/main" id="1" dur="indefinite" restart="never" nodeType="tmRoot"/>
+      </p:par>
+    </p:tnLst>
+  </p:timing>
 </p:sld>
 </file>
 
@@ -9447,7 +9454,11 @@
           <a:bodyPr/>
           <a:lstStyle/>
           <a:p>
-            <a:endParaRPr lang="en-US"/>
+            <a:r>
+              <a:rPr lang="en-US" dirty="0" smtClean="0"/>
+              <a:t>Remove the Default Test</a:t>
+            </a:r>
+            <a:endParaRPr lang="en-US" dirty="0"/>
           </a:p>
         </p:txBody>
       </p:sp>
@@ -9697,7 +9708,11 @@
           <a:bodyPr/>
           <a:lstStyle/>
           <a:p>
-            <a:endParaRPr lang="en-US"/>
+            <a:r>
+              <a:rPr lang="en-US" dirty="0" smtClean="0"/>
+              <a:t>Add a Test to Validate a Working Website</a:t>
+            </a:r>
+            <a:endParaRPr lang="en-US" dirty="0"/>
           </a:p>
         </p:txBody>
       </p:sp>
@@ -10128,7 +10143,15 @@
           <a:bodyPr/>
           <a:lstStyle/>
           <a:p>
-            <a:endParaRPr lang="en-US"/>
+            <a:r>
+              <a:rPr lang="en-US" dirty="0" smtClean="0"/>
+              <a:t>Move </a:t>
+            </a:r>
+            <a:r>
+              <a:rPr lang="en-US" dirty="0" smtClean="0"/>
+              <a:t>into the Cookbook Directory</a:t>
+            </a:r>
+            <a:endParaRPr lang="en-US" dirty="0"/>
           </a:p>
         </p:txBody>
       </p:sp>
@@ -10177,10 +10200,24 @@
         </p:nvSpPr>
         <p:spPr/>
         <p:txBody>
-          <a:bodyPr/>
+          <a:bodyPr>
+            <a:normAutofit/>
+          </a:bodyPr>
           <a:lstStyle/>
           <a:p>
-            <a:endParaRPr lang="en-US"/>
+            <a:r>
+              <a:rPr lang="en-US" sz="4800" dirty="0" smtClean="0"/>
+              <a:t>Remove Settings </a:t>
+            </a:r>
+            <a:r>
+              <a:rPr lang="en-US" sz="4800" dirty="0" smtClean="0"/>
+              <a:t>from </a:t>
+            </a:r>
+            <a:r>
+              <a:rPr lang="en-US" sz="4800" dirty="0" smtClean="0"/>
+              <a:t>the Kitchen Configuration</a:t>
+            </a:r>
+            <a:endParaRPr lang="en-US" sz="4800" dirty="0"/>
           </a:p>
         </p:txBody>
       </p:sp>
@@ -10458,7 +10495,11 @@
           <a:bodyPr/>
           <a:lstStyle/>
           <a:p>
-            <a:endParaRPr lang="en-US"/>
+            <a:r>
+              <a:rPr lang="en-US" dirty="0" smtClean="0"/>
+              <a:t>Add Settings to the Kitchen Configuration</a:t>
+            </a:r>
+            <a:endParaRPr lang="en-US" dirty="0"/>
           </a:p>
         </p:txBody>
       </p:sp>
@@ -10846,7 +10887,11 @@
           <a:bodyPr/>
           <a:lstStyle/>
           <a:p>
-            <a:endParaRPr lang="en-US"/>
+            <a:r>
+              <a:rPr lang="en-US" dirty="0" smtClean="0"/>
+              <a:t>View the Test Matrix for Test Kitchen</a:t>
+            </a:r>
+            <a:endParaRPr lang="en-US" dirty="0"/>
           </a:p>
         </p:txBody>
       </p:sp>
@@ -11062,7 +11107,11 @@
           <a:bodyPr/>
           <a:lstStyle/>
           <a:p>
-            <a:endParaRPr lang="en-US"/>
+            <a:r>
+              <a:rPr lang="en-US" dirty="0" smtClean="0"/>
+              <a:t>Create the Virtual Instance</a:t>
+            </a:r>
+            <a:endParaRPr lang="en-US" dirty="0"/>
           </a:p>
         </p:txBody>
       </p:sp>
@@ -11367,7 +11416,11 @@
           <a:bodyPr/>
           <a:lstStyle/>
           <a:p>
-            <a:endParaRPr lang="en-US"/>
+            <a:r>
+              <a:rPr lang="en-US" dirty="0" smtClean="0"/>
+              <a:t>Converge the Virtual Instance</a:t>
+            </a:r>
+            <a:endParaRPr lang="en-US" dirty="0"/>
           </a:p>
         </p:txBody>
       </p:sp>
@@ -11774,10 +11827,16 @@
         </p:nvSpPr>
         <p:spPr/>
         <p:txBody>
-          <a:bodyPr/>
+          <a:bodyPr>
+            <a:normAutofit fontScale="90000"/>
+          </a:bodyPr>
           <a:lstStyle/>
           <a:p>
-            <a:endParaRPr lang="en-US"/>
+            <a:r>
+              <a:rPr lang="en-US" dirty="0" smtClean="0"/>
+              <a:t>Execute the Tests Against the Virtual Instance</a:t>
+            </a:r>
+            <a:endParaRPr lang="en-US" dirty="0"/>
           </a:p>
         </p:txBody>
       </p:sp>
@@ -11917,6 +11976,13 @@
   <p:transition xmlns:p14="http://schemas.microsoft.com/office/powerpoint/2010/main" spd="med">
     <p:fade/>
   </p:transition>
+  <p:timing>
+    <p:tnLst>
+      <p:par>
+        <p:cTn xmlns:p14="http://schemas.microsoft.com/office/powerpoint/2010/main" id="1" dur="indefinite" restart="never" nodeType="tmRoot"/>
+      </p:par>
+    </p:tnLst>
+  </p:timing>
 </p:sld>
 </file>
 
@@ -12789,7 +12855,11 @@
           <a:bodyPr/>
           <a:lstStyle/>
           <a:p>
-            <a:endParaRPr lang="en-US"/>
+            <a:r>
+              <a:rPr lang="en-US" dirty="0" smtClean="0"/>
+              <a:t>Write the Default Recipe for the Cookbook</a:t>
+            </a:r>
+            <a:endParaRPr lang="en-US" dirty="0"/>
           </a:p>
         </p:txBody>
       </p:sp>
@@ -13339,6 +13409,10 @@
           <a:bodyPr/>
           <a:lstStyle/>
           <a:p>
+            <a:r>
+              <a:rPr lang="en-US" dirty="0" smtClean="0"/>
+              <a:t>Re-Converge the Virtual Instance</a:t>
+            </a:r>
             <a:endParaRPr lang="en-US" dirty="0"/>
           </a:p>
         </p:txBody>
@@ -13510,6 +13584,10 @@
           <a:bodyPr/>
           <a:lstStyle/>
           <a:p>
+            <a:r>
+              <a:rPr lang="en-US" dirty="0" smtClean="0"/>
+              <a:t>Re-Verify the Virtual Instance</a:t>
+            </a:r>
             <a:endParaRPr lang="en-US" dirty="0"/>
           </a:p>
         </p:txBody>
@@ -13882,10 +13960,16 @@
         </p:nvSpPr>
         <p:spPr/>
         <p:txBody>
-          <a:bodyPr/>
+          <a:bodyPr>
+            <a:normAutofit fontScale="90000"/>
+          </a:bodyPr>
           <a:lstStyle/>
           <a:p>
-            <a:endParaRPr lang="en-US"/>
+            <a:r>
+              <a:rPr lang="en-US" dirty="0" smtClean="0"/>
+              <a:t>Update the Test Value to be More Accurate</a:t>
+            </a:r>
+            <a:endParaRPr lang="en-US" dirty="0"/>
           </a:p>
         </p:txBody>
       </p:sp>
@@ -14235,6 +14319,14 @@
           <a:bodyPr/>
           <a:lstStyle/>
           <a:p>
+            <a:r>
+              <a:rPr lang="en-US" dirty="0" smtClean="0"/>
+              <a:t>Re-Verify the </a:t>
+            </a:r>
+            <a:r>
+              <a:rPr lang="en-US" smtClean="0"/>
+              <a:t>Virtual Instance</a:t>
+            </a:r>
             <a:endParaRPr lang="en-US" dirty="0"/>
           </a:p>
         </p:txBody>
@@ -14692,10 +14784,16 @@
         </p:nvSpPr>
         <p:spPr/>
         <p:txBody>
-          <a:bodyPr/>
+          <a:bodyPr>
+            <a:normAutofit fontScale="90000"/>
+          </a:bodyPr>
           <a:lstStyle/>
           <a:p>
-            <a:endParaRPr lang="en-US"/>
+            <a:r>
+              <a:rPr lang="en-US" dirty="0" smtClean="0"/>
+              <a:t>Lets Start this Journey in the Home Directory</a:t>
+            </a:r>
+            <a:endParaRPr lang="en-US" dirty="0"/>
           </a:p>
         </p:txBody>
       </p:sp>
@@ -14898,7 +14996,11 @@
           <a:bodyPr/>
           <a:lstStyle/>
           <a:p>
-            <a:endParaRPr lang="en-US"/>
+            <a:r>
+              <a:rPr lang="en-US" dirty="0" smtClean="0"/>
+              <a:t>Ask Chef About Generating a Cookbook</a:t>
+            </a:r>
+            <a:endParaRPr lang="en-US" dirty="0"/>
           </a:p>
         </p:txBody>
       </p:sp>
@@ -15154,7 +15256,11 @@
           <a:bodyPr/>
           <a:lstStyle/>
           <a:p>
-            <a:endParaRPr lang="en-US"/>
+            <a:r>
+              <a:rPr lang="en-US" dirty="0" smtClean="0"/>
+              <a:t>Generate a Cookbook</a:t>
+            </a:r>
+            <a:endParaRPr lang="en-US" dirty="0"/>
           </a:p>
         </p:txBody>
       </p:sp>
@@ -15245,11 +15351,6 @@
               </a:rPr>
               <a:t> - install version 1.5.3-3.el6 of package tree</a:t>
             </a:r>
-            <a:endParaRPr lang="en-US" dirty="0">
-              <a:solidFill>
-                <a:srgbClr val="CCFFCC"/>
-              </a:solidFill>
-            </a:endParaRPr>
           </a:p>
         </p:txBody>
       </p:sp>
@@ -15284,7 +15385,6 @@
               <a:rPr lang="en-US" dirty="0"/>
               <a:t>chef-apply -e 'package "tree"'</a:t>
             </a:r>
-            <a:endParaRPr lang="en-US" dirty="0"/>
           </a:p>
         </p:txBody>
       </p:sp>
@@ -15305,7 +15405,7 @@
           <a:p>
             <a:r>
               <a:rPr lang="en-US" dirty="0" smtClean="0"/>
-              <a:t>chef-apply</a:t>
+              <a:t>Install the Package Tree to Aid Us</a:t>
             </a:r>
             <a:endParaRPr lang="en-US" dirty="0"/>
           </a:p>
@@ -15505,10 +15605,16 @@
         </p:nvSpPr>
         <p:spPr/>
         <p:txBody>
-          <a:bodyPr/>
+          <a:bodyPr>
+            <a:normAutofit/>
+          </a:bodyPr>
           <a:lstStyle/>
           <a:p>
-            <a:endParaRPr lang="en-US"/>
+            <a:r>
+              <a:rPr lang="en-US" sz="5400" dirty="0" smtClean="0"/>
+              <a:t>View the Tests in the Generated Cookbook</a:t>
+            </a:r>
+            <a:endParaRPr lang="en-US" sz="5400" dirty="0"/>
           </a:p>
         </p:txBody>
       </p:sp>
@@ -16065,7 +16171,7 @@
   <a:extraClrSchemeLst/>
   <a:extLst>
     <a:ext uri="{05A4C25C-085E-4340-85A3-A5531E510DB2}">
-      <thm15:themeFamily xmlns:thm15="http://schemas.microsoft.com/office/thememl/2012/main" xmlns="" name="Chef-TemplateComps_v09-16x9-Light.potx" id="{078CEFDB-FA7A-4E36-9964-13EF367585CB}" vid="{8B87B0F3-7308-43D5-8388-E1B49EA02652}"/>
+      <thm15:themeFamily xmlns="" xmlns:thm15="http://schemas.microsoft.com/office/thememl/2012/main" name="Chef-TemplateComps_v09-16x9-Light.potx" id="{078CEFDB-FA7A-4E36-9964-13EF367585CB}" vid="{8B87B0F3-7308-43D5-8388-E1B49EA02652}"/>
     </a:ext>
   </a:extLst>
 </a:theme>
@@ -16447,7 +16553,7 @@
   <a:extraClrSchemeLst/>
   <a:extLst>
     <a:ext uri="{05A4C25C-085E-4340-85A3-A5531E510DB2}">
-      <thm15:themeFamily xmlns:thm15="http://schemas.microsoft.com/office/thememl/2012/main" xmlns="" name="Chef-TemplateComps_v09-16x9-Light.potx" id="{078CEFDB-FA7A-4E36-9964-13EF367585CB}" vid="{8B87B0F3-7308-43D5-8388-E1B49EA02652}"/>
+      <thm15:themeFamily xmlns="" xmlns:thm15="http://schemas.microsoft.com/office/thememl/2012/main" name="Chef-TemplateComps_v09-16x9-Light.potx" id="{078CEFDB-FA7A-4E36-9964-13EF367585CB}" vid="{8B87B0F3-7308-43D5-8388-E1B49EA02652}"/>
     </a:ext>
   </a:extLst>
 </a:theme>

</xml_diff>

<commit_message>
Updated slides for teaching
Changes made after the last time this class was presented. I unfortunately will not mention the details here as I did not keep accurate notes.
</commit_message>
<xml_diff>
--- a/01-building_cookbooks_with_tests.pptx
+++ b/01-building_cookbooks_with_tests.pptx
@@ -176,6 +176,25 @@
       </a:defRPr>
     </a:lvl9pPr>
   </p:defaultTextStyle>
+  <p:extLst>
+    <p:ext uri="{EFAFB233-063F-42B5-8137-9DF3F51BA10A}">
+      <p15:sldGuideLst xmlns:p15="http://schemas.microsoft.com/office/powerpoint/2012/main">
+        <p15:guide id="1" orient="horz" pos="894">
+          <p15:clr>
+            <a:srgbClr val="A4A3A4"/>
+          </p15:clr>
+        </p15:guide>
+        <p15:guide id="2" pos="9120">
+          <p15:clr>
+            <a:srgbClr val="A4A3A4"/>
+          </p15:clr>
+        </p15:guide>
+      </p15:sldGuideLst>
+    </p:ext>
+    <p:ext uri="{2D200454-40CA-4A62-9FC3-DE9A4176ACB9}">
+      <p15:notesGuideLst xmlns:p15="http://schemas.microsoft.com/office/powerpoint/2012/main"/>
+    </p:ext>
+  </p:extLst>
 </p:presentation>
 </file>
 
@@ -290,7 +309,7 @@
               <a:pPr>
                 <a:defRPr/>
               </a:pPr>
-              <a:t>10/26/15</a:t>
+              <a:t>2015-11-10</a:t>
             </a:fld>
             <a:endParaRPr lang="en-US" dirty="0"/>
           </a:p>
@@ -473,7 +492,7 @@
               <a:pPr>
                 <a:defRPr/>
               </a:pPr>
-              <a:t>10/26/15</a:t>
+              <a:t>2015-11-10</a:t>
             </a:fld>
             <a:endParaRPr lang="en-US" dirty="0"/>
           </a:p>
@@ -1157,7 +1176,7 @@
   <p:clrMapOvr>
     <a:masterClrMapping/>
   </p:clrMapOvr>
-  <p:transition xmlns:p14="http://schemas.microsoft.com/office/powerpoint/2010/main" spd="med">
+  <p:transition spd="med">
     <p:fade/>
   </p:transition>
 </p:sldLayout>
@@ -1452,7 +1471,7 @@
   <p:clrMapOvr>
     <a:overrideClrMapping bg1="lt1" tx1="dk1" bg2="lt2" tx2="dk2" accent1="accent1" accent2="accent2" accent3="accent3" accent4="accent4" accent5="accent5" accent6="accent6" hlink="hlink" folHlink="folHlink"/>
   </p:clrMapOvr>
-  <p:transition xmlns:p14="http://schemas.microsoft.com/office/powerpoint/2010/main" spd="med">
+  <p:transition spd="med">
     <p:fade/>
   </p:transition>
 </p:sldLayout>
@@ -1585,14 +1604,14 @@
           </a:ln>
           <a:extLst>
             <a:ext uri="{909E8E84-426E-40dd-AFC4-6F175D3DCCD1}">
-              <a14:hiddenFill xmlns:a14="http://schemas.microsoft.com/office/drawing/2010/main">
+              <a14:hiddenFill xmlns:a14="http://schemas.microsoft.com/office/drawing/2010/main" xmlns="">
                 <a:solidFill>
                   <a:srgbClr val="FFFFFF"/>
                 </a:solidFill>
               </a14:hiddenFill>
             </a:ext>
             <a:ext uri="{91240B29-F687-4f45-9708-019B960494DF}">
-              <a14:hiddenLine xmlns:a14="http://schemas.microsoft.com/office/drawing/2010/main" w="9525">
+              <a14:hiddenLine xmlns:a14="http://schemas.microsoft.com/office/drawing/2010/main" xmlns="" w="9525">
                 <a:solidFill>
                   <a:srgbClr val="000000"/>
                 </a:solidFill>
@@ -1740,14 +1759,14 @@
           </a:ln>
           <a:extLst>
             <a:ext uri="{909E8E84-426E-40dd-AFC4-6F175D3DCCD1}">
-              <a14:hiddenFill xmlns:a14="http://schemas.microsoft.com/office/drawing/2010/main">
+              <a14:hiddenFill xmlns:a14="http://schemas.microsoft.com/office/drawing/2010/main" xmlns="">
                 <a:solidFill>
                   <a:srgbClr val="FFFFFF"/>
                 </a:solidFill>
               </a14:hiddenFill>
             </a:ext>
             <a:ext uri="{91240B29-F687-4f45-9708-019B960494DF}">
-              <a14:hiddenLine xmlns:a14="http://schemas.microsoft.com/office/drawing/2010/main" w="9525">
+              <a14:hiddenLine xmlns:a14="http://schemas.microsoft.com/office/drawing/2010/main" xmlns="" w="9525">
                 <a:solidFill>
                   <a:srgbClr val="000000"/>
                 </a:solidFill>
@@ -2145,7 +2164,7 @@
   <p:clrMapOvr>
     <a:overrideClrMapping bg1="lt1" tx1="dk1" bg2="lt2" tx2="dk2" accent1="accent1" accent2="accent2" accent3="accent3" accent4="accent4" accent5="accent5" accent6="accent6" hlink="hlink" folHlink="folHlink"/>
   </p:clrMapOvr>
-  <p:transition xmlns:p14="http://schemas.microsoft.com/office/powerpoint/2010/main" spd="med">
+  <p:transition spd="med">
     <p:fade/>
   </p:transition>
 </p:sldLayout>
@@ -2238,14 +2257,14 @@
           </a:ln>
           <a:extLst>
             <a:ext uri="{909E8E84-426E-40dd-AFC4-6F175D3DCCD1}">
-              <a14:hiddenFill xmlns:a14="http://schemas.microsoft.com/office/drawing/2010/main">
+              <a14:hiddenFill xmlns:a14="http://schemas.microsoft.com/office/drawing/2010/main" xmlns="">
                 <a:solidFill>
                   <a:srgbClr val="FFFFFF"/>
                 </a:solidFill>
               </a14:hiddenFill>
             </a:ext>
             <a:ext uri="{91240B29-F687-4f45-9708-019B960494DF}">
-              <a14:hiddenLine xmlns:a14="http://schemas.microsoft.com/office/drawing/2010/main" w="9525">
+              <a14:hiddenLine xmlns:a14="http://schemas.microsoft.com/office/drawing/2010/main" xmlns="" w="9525">
                 <a:solidFill>
                   <a:srgbClr val="000000"/>
                 </a:solidFill>
@@ -2267,7 +2286,7 @@
   <p:clrMapOvr>
     <a:masterClrMapping/>
   </p:clrMapOvr>
-  <p:transition xmlns:p14="http://schemas.microsoft.com/office/powerpoint/2010/main" spd="med">
+  <p:transition spd="med">
     <p:fade/>
   </p:transition>
 </p:sldLayout>
@@ -2554,7 +2573,7 @@
   <p:clrMapOvr>
     <a:masterClrMapping/>
   </p:clrMapOvr>
-  <p:transition xmlns:p14="http://schemas.microsoft.com/office/powerpoint/2010/main" spd="med">
+  <p:transition spd="med">
     <p:fade/>
   </p:transition>
 </p:sldLayout>
@@ -2841,7 +2860,7 @@
   <p:clrMapOvr>
     <a:masterClrMapping/>
   </p:clrMapOvr>
-  <p:transition xmlns:p14="http://schemas.microsoft.com/office/powerpoint/2010/main" spd="med">
+  <p:transition spd="med">
     <p:fade/>
   </p:transition>
 </p:sldLayout>
@@ -3190,7 +3209,7 @@
   <p:clrMapOvr>
     <a:masterClrMapping/>
   </p:clrMapOvr>
-  <p:transition xmlns:p14="http://schemas.microsoft.com/office/powerpoint/2010/main" spd="med">
+  <p:transition spd="med">
     <p:fade/>
   </p:transition>
 </p:sldLayout>
@@ -3477,7 +3496,7 @@
   <p:clrMapOvr>
     <a:masterClrMapping/>
   </p:clrMapOvr>
-  <p:transition xmlns:p14="http://schemas.microsoft.com/office/powerpoint/2010/main" spd="med">
+  <p:transition spd="med">
     <p:fade/>
   </p:transition>
 </p:sldLayout>
@@ -3694,14 +3713,14 @@
           </a:ln>
           <a:extLst>
             <a:ext uri="{909E8E84-426E-40dd-AFC4-6F175D3DCCD1}">
-              <a14:hiddenFill xmlns:a14="http://schemas.microsoft.com/office/drawing/2010/main">
+              <a14:hiddenFill xmlns:a14="http://schemas.microsoft.com/office/drawing/2010/main" xmlns="">
                 <a:solidFill>
                   <a:srgbClr val="FFFFFF"/>
                 </a:solidFill>
               </a14:hiddenFill>
             </a:ext>
             <a:ext uri="{91240B29-F687-4f45-9708-019B960494DF}">
-              <a14:hiddenLine xmlns:a14="http://schemas.microsoft.com/office/drawing/2010/main" w="9525">
+              <a14:hiddenLine xmlns:a14="http://schemas.microsoft.com/office/drawing/2010/main" xmlns="" w="9525">
                 <a:solidFill>
                   <a:srgbClr val="000000"/>
                 </a:solidFill>
@@ -3898,7 +3917,7 @@
   <p:clrMapOvr>
     <a:masterClrMapping/>
   </p:clrMapOvr>
-  <p:transition xmlns:p14="http://schemas.microsoft.com/office/powerpoint/2010/main" spd="med">
+  <p:transition spd="med">
     <p:fade/>
   </p:transition>
 </p:sldLayout>
@@ -4186,7 +4205,7 @@
   <p:clrMapOvr>
     <a:masterClrMapping/>
   </p:clrMapOvr>
-  <p:transition xmlns:p14="http://schemas.microsoft.com/office/powerpoint/2010/main" spd="med">
+  <p:transition spd="med">
     <p:fade/>
   </p:transition>
 </p:sldLayout>
@@ -4498,7 +4517,7 @@
   <p:clrMapOvr>
     <a:masterClrMapping/>
   </p:clrMapOvr>
-  <p:transition xmlns:p14="http://schemas.microsoft.com/office/powerpoint/2010/main" spd="med">
+  <p:transition spd="med">
     <p:fade/>
   </p:transition>
 </p:sldLayout>
@@ -4675,7 +4694,7 @@
   <p:clrMapOvr>
     <a:masterClrMapping/>
   </p:clrMapOvr>
-  <p:transition xmlns:p14="http://schemas.microsoft.com/office/powerpoint/2010/main" spd="med">
+  <p:transition spd="med">
     <p:fade/>
   </p:transition>
 </p:sldLayout>
@@ -4979,7 +4998,7 @@
   <p:clrMapOvr>
     <a:masterClrMapping/>
   </p:clrMapOvr>
-  <p:transition xmlns:p14="http://schemas.microsoft.com/office/powerpoint/2010/main" spd="med">
+  <p:transition spd="med">
     <p:fade/>
   </p:transition>
 </p:sldLayout>
@@ -5055,14 +5074,14 @@
           </a:ln>
           <a:extLst>
             <a:ext uri="{909E8E84-426E-40dd-AFC4-6F175D3DCCD1}">
-              <a14:hiddenFill xmlns:a14="http://schemas.microsoft.com/office/drawing/2010/main">
+              <a14:hiddenFill xmlns:a14="http://schemas.microsoft.com/office/drawing/2010/main" xmlns="">
                 <a:solidFill>
                   <a:srgbClr val="FFFFFF"/>
                 </a:solidFill>
               </a14:hiddenFill>
             </a:ext>
             <a:ext uri="{91240B29-F687-4f45-9708-019B960494DF}">
-              <a14:hiddenLine xmlns:a14="http://schemas.microsoft.com/office/drawing/2010/main" w="9525">
+              <a14:hiddenLine xmlns:a14="http://schemas.microsoft.com/office/drawing/2010/main" xmlns="" w="9525">
                 <a:solidFill>
                   <a:srgbClr val="000000"/>
                 </a:solidFill>
@@ -5347,7 +5366,7 @@
   <p:clrMapOvr>
     <a:overrideClrMapping bg1="lt1" tx1="dk1" bg2="lt2" tx2="dk2" accent1="accent1" accent2="accent2" accent3="accent3" accent4="accent4" accent5="accent5" accent6="accent6" hlink="hlink" folHlink="folHlink"/>
   </p:clrMapOvr>
-  <p:transition xmlns:p14="http://schemas.microsoft.com/office/powerpoint/2010/main" spd="med">
+  <p:transition spd="med">
     <p:fade/>
   </p:transition>
 </p:sldLayout>
@@ -5423,14 +5442,14 @@
           </a:ln>
           <a:extLst>
             <a:ext uri="{909E8E84-426E-40dd-AFC4-6F175D3DCCD1}">
-              <a14:hiddenFill xmlns:a14="http://schemas.microsoft.com/office/drawing/2010/main">
+              <a14:hiddenFill xmlns:a14="http://schemas.microsoft.com/office/drawing/2010/main" xmlns="">
                 <a:solidFill>
                   <a:srgbClr val="FFFFFF"/>
                 </a:solidFill>
               </a14:hiddenFill>
             </a:ext>
             <a:ext uri="{91240B29-F687-4f45-9708-019B960494DF}">
-              <a14:hiddenLine xmlns:a14="http://schemas.microsoft.com/office/drawing/2010/main" w="9525">
+              <a14:hiddenLine xmlns:a14="http://schemas.microsoft.com/office/drawing/2010/main" xmlns="" w="9525">
                 <a:solidFill>
                   <a:srgbClr val="000000"/>
                 </a:solidFill>
@@ -5710,7 +5729,7 @@
   <p:clrMapOvr>
     <a:overrideClrMapping bg1="lt1" tx1="dk1" bg2="lt2" tx2="dk2" accent1="accent1" accent2="accent2" accent3="accent3" accent4="accent4" accent5="accent5" accent6="accent6" hlink="hlink" folHlink="folHlink"/>
   </p:clrMapOvr>
-  <p:transition xmlns:p14="http://schemas.microsoft.com/office/powerpoint/2010/main" spd="med">
+  <p:transition spd="med">
     <p:fade/>
   </p:transition>
 </p:sldLayout>
@@ -5786,14 +5805,14 @@
           </a:ln>
           <a:extLst>
             <a:ext uri="{909E8E84-426E-40dd-AFC4-6F175D3DCCD1}">
-              <a14:hiddenFill xmlns:a14="http://schemas.microsoft.com/office/drawing/2010/main">
+              <a14:hiddenFill xmlns:a14="http://schemas.microsoft.com/office/drawing/2010/main" xmlns="">
                 <a:solidFill>
                   <a:srgbClr val="FFFFFF"/>
                 </a:solidFill>
               </a14:hiddenFill>
             </a:ext>
             <a:ext uri="{91240B29-F687-4f45-9708-019B960494DF}">
-              <a14:hiddenLine xmlns:a14="http://schemas.microsoft.com/office/drawing/2010/main" w="9525">
+              <a14:hiddenLine xmlns:a14="http://schemas.microsoft.com/office/drawing/2010/main" xmlns="" w="9525">
                 <a:solidFill>
                   <a:srgbClr val="000000"/>
                 </a:solidFill>
@@ -6069,7 +6088,7 @@
   <p:clrMapOvr>
     <a:overrideClrMapping bg1="lt1" tx1="dk1" bg2="lt2" tx2="dk2" accent1="accent1" accent2="accent2" accent3="accent3" accent4="accent4" accent5="accent5" accent6="accent6" hlink="hlink" folHlink="folHlink"/>
   </p:clrMapOvr>
-  <p:transition xmlns:p14="http://schemas.microsoft.com/office/powerpoint/2010/main" spd="med">
+  <p:transition spd="med">
     <p:fade/>
   </p:transition>
 </p:sldLayout>
@@ -6275,7 +6294,7 @@
   <p:clrMapOvr>
     <a:overrideClrMapping bg1="lt1" tx1="dk1" bg2="lt2" tx2="dk2" accent1="accent1" accent2="accent2" accent3="accent3" accent4="accent4" accent5="accent5" accent6="accent6" hlink="hlink" folHlink="folHlink"/>
   </p:clrMapOvr>
-  <p:transition xmlns:p14="http://schemas.microsoft.com/office/powerpoint/2010/main" spd="med">
+  <p:transition spd="med">
     <p:fade/>
   </p:transition>
 </p:sldLayout>
@@ -6351,14 +6370,14 @@
           </a:ln>
           <a:extLst>
             <a:ext uri="{909E8E84-426E-40dd-AFC4-6F175D3DCCD1}">
-              <a14:hiddenFill xmlns:a14="http://schemas.microsoft.com/office/drawing/2010/main">
+              <a14:hiddenFill xmlns:a14="http://schemas.microsoft.com/office/drawing/2010/main" xmlns="">
                 <a:solidFill>
                   <a:srgbClr val="FFFFFF"/>
                 </a:solidFill>
               </a14:hiddenFill>
             </a:ext>
             <a:ext uri="{91240B29-F687-4f45-9708-019B960494DF}">
-              <a14:hiddenLine xmlns:a14="http://schemas.microsoft.com/office/drawing/2010/main" w="9525">
+              <a14:hiddenLine xmlns:a14="http://schemas.microsoft.com/office/drawing/2010/main" xmlns="" w="9525">
                 <a:solidFill>
                   <a:srgbClr val="000000"/>
                 </a:solidFill>
@@ -6641,7 +6660,7 @@
   <p:clrMapOvr>
     <a:overrideClrMapping bg1="lt1" tx1="dk1" bg2="lt2" tx2="dk2" accent1="accent1" accent2="accent2" accent3="accent3" accent4="accent4" accent5="accent5" accent6="accent6" hlink="hlink" folHlink="folHlink"/>
   </p:clrMapOvr>
-  <p:transition xmlns:p14="http://schemas.microsoft.com/office/powerpoint/2010/main" spd="med">
+  <p:transition spd="med">
     <p:fade/>
   </p:transition>
 </p:sldLayout>
@@ -6849,7 +6868,7 @@
   <p:clrMapOvr>
     <a:overrideClrMapping bg1="lt1" tx1="dk1" bg2="lt2" tx2="dk2" accent1="accent1" accent2="accent2" accent3="accent3" accent4="accent4" accent5="accent5" accent6="accent6" hlink="hlink" folHlink="folHlink"/>
   </p:clrMapOvr>
-  <p:transition xmlns:p14="http://schemas.microsoft.com/office/powerpoint/2010/main" spd="med">
+  <p:transition spd="med">
     <p:fade/>
   </p:transition>
 </p:sldLayout>
@@ -6925,14 +6944,14 @@
           </a:ln>
           <a:extLst>
             <a:ext uri="{909E8E84-426E-40dd-AFC4-6F175D3DCCD1}">
-              <a14:hiddenFill xmlns:a14="http://schemas.microsoft.com/office/drawing/2010/main">
+              <a14:hiddenFill xmlns:a14="http://schemas.microsoft.com/office/drawing/2010/main" xmlns="">
                 <a:solidFill>
                   <a:srgbClr val="FFFFFF"/>
                 </a:solidFill>
               </a14:hiddenFill>
             </a:ext>
             <a:ext uri="{91240B29-F687-4f45-9708-019B960494DF}">
-              <a14:hiddenLine xmlns:a14="http://schemas.microsoft.com/office/drawing/2010/main" w="9525">
+              <a14:hiddenLine xmlns:a14="http://schemas.microsoft.com/office/drawing/2010/main" xmlns="" w="9525">
                 <a:solidFill>
                   <a:srgbClr val="000000"/>
                 </a:solidFill>
@@ -7200,7 +7219,7 @@
   <p:clrMapOvr>
     <a:overrideClrMapping bg1="lt1" tx1="dk1" bg2="lt2" tx2="dk2" accent1="accent1" accent2="accent2" accent3="accent3" accent4="accent4" accent5="accent5" accent6="accent6" hlink="hlink" folHlink="folHlink"/>
   </p:clrMapOvr>
-  <p:transition xmlns:p14="http://schemas.microsoft.com/office/powerpoint/2010/main" spd="med">
+  <p:transition spd="med">
     <p:fade/>
   </p:transition>
 </p:sldLayout>
@@ -7428,7 +7447,7 @@
   <p:clrMapOvr>
     <a:overrideClrMapping bg1="lt1" tx1="dk1" bg2="lt2" tx2="dk2" accent1="accent1" accent2="accent2" accent3="accent3" accent4="accent4" accent5="accent5" accent6="accent6" hlink="hlink" folHlink="folHlink"/>
   </p:clrMapOvr>
-  <p:transition xmlns:p14="http://schemas.microsoft.com/office/powerpoint/2010/main" spd="med">
+  <p:transition spd="med">
     <p:fade/>
   </p:transition>
 </p:sldLayout>
@@ -7716,7 +7735,7 @@
   <p:clrMapOvr>
     <a:overrideClrMapping bg1="lt1" tx1="dk1" bg2="lt2" tx2="dk2" accent1="accent1" accent2="accent2" accent3="accent3" accent4="accent4" accent5="accent5" accent6="accent6" hlink="hlink" folHlink="folHlink"/>
   </p:clrMapOvr>
-  <p:transition xmlns:p14="http://schemas.microsoft.com/office/powerpoint/2010/main" spd="med">
+  <p:transition spd="med">
     <p:fade/>
   </p:transition>
 </p:sldLayout>
@@ -7872,14 +7891,14 @@
           </a:ln>
           <a:extLst>
             <a:ext uri="{909E8E84-426E-40dd-AFC4-6F175D3DCCD1}">
-              <a14:hiddenFill xmlns:a14="http://schemas.microsoft.com/office/drawing/2010/main">
+              <a14:hiddenFill xmlns:a14="http://schemas.microsoft.com/office/drawing/2010/main" xmlns="">
                 <a:solidFill>
                   <a:srgbClr val="FFFFFF"/>
                 </a:solidFill>
               </a14:hiddenFill>
             </a:ext>
             <a:ext uri="{91240B29-F687-4f45-9708-019B960494DF}">
-              <a14:hiddenLine xmlns:a14="http://schemas.microsoft.com/office/drawing/2010/main" w="9525">
+              <a14:hiddenLine xmlns:a14="http://schemas.microsoft.com/office/drawing/2010/main" xmlns="" w="9525">
                 <a:solidFill>
                   <a:srgbClr val="000000"/>
                 </a:solidFill>
@@ -8085,13 +8104,13 @@
     <p:sldLayoutId id="2147483841" r:id="rId11"/>
     <p:sldLayoutId id="2147483843" r:id="rId12"/>
   </p:sldLayoutIdLst>
-  <p:transition xmlns:p14="http://schemas.microsoft.com/office/powerpoint/2010/main" spd="med">
+  <p:transition spd="med">
     <p:fade/>
   </p:transition>
   <p:timing>
     <p:tnLst>
       <p:par>
-        <p:cTn xmlns:p14="http://schemas.microsoft.com/office/powerpoint/2010/main" id="1" dur="indefinite" restart="never" nodeType="tmRoot"/>
+        <p:cTn id="1" dur="indefinite" restart="never" nodeType="tmRoot"/>
       </p:par>
     </p:tnLst>
   </p:timing>
@@ -8619,14 +8638,14 @@
           </a:ln>
           <a:extLst>
             <a:ext uri="{909E8E84-426E-40dd-AFC4-6F175D3DCCD1}">
-              <a14:hiddenFill xmlns:a14="http://schemas.microsoft.com/office/drawing/2010/main">
+              <a14:hiddenFill xmlns:a14="http://schemas.microsoft.com/office/drawing/2010/main" xmlns="">
                 <a:solidFill>
                   <a:srgbClr val="FFFFFF"/>
                 </a:solidFill>
               </a14:hiddenFill>
             </a:ext>
             <a:ext uri="{91240B29-F687-4f45-9708-019B960494DF}">
-              <a14:hiddenLine xmlns:a14="http://schemas.microsoft.com/office/drawing/2010/main" w="9525">
+              <a14:hiddenLine xmlns:a14="http://schemas.microsoft.com/office/drawing/2010/main" xmlns="" w="9525">
                 <a:solidFill>
                   <a:srgbClr val="000000"/>
                 </a:solidFill>
@@ -8905,13 +8924,13 @@
     <p:sldLayoutId id="2147483867" r:id="rId9"/>
     <p:sldLayoutId id="2147483869" r:id="rId10"/>
   </p:sldLayoutIdLst>
-  <p:transition xmlns:p14="http://schemas.microsoft.com/office/powerpoint/2010/main" spd="med">
+  <p:transition spd="med">
     <p:fade/>
   </p:transition>
   <p:timing>
     <p:tnLst>
       <p:par>
-        <p:cTn xmlns:p14="http://schemas.microsoft.com/office/powerpoint/2010/main" id="1" dur="indefinite" restart="never" nodeType="tmRoot"/>
+        <p:cTn id="1" dur="indefinite" restart="never" nodeType="tmRoot"/>
       </p:par>
     </p:tnLst>
   </p:timing>
@@ -9409,13 +9428,13 @@
   <p:clrMapOvr>
     <a:masterClrMapping/>
   </p:clrMapOvr>
-  <p:transition xmlns:p14="http://schemas.microsoft.com/office/powerpoint/2010/main" spd="med">
+  <p:transition spd="med">
     <p:fade/>
   </p:transition>
   <p:timing>
     <p:tnLst>
       <p:par>
-        <p:cTn xmlns:p14="http://schemas.microsoft.com/office/powerpoint/2010/main" id="1" dur="indefinite" restart="never" nodeType="tmRoot"/>
+        <p:cTn id="1" dur="indefinite" restart="never" nodeType="tmRoot"/>
       </p:par>
     </p:tnLst>
   </p:timing>
@@ -9663,13 +9682,13 @@
   <p:clrMapOvr>
     <a:masterClrMapping/>
   </p:clrMapOvr>
-  <p:transition xmlns:p14="http://schemas.microsoft.com/office/powerpoint/2010/main" spd="med">
+  <p:transition spd="med">
     <p:fade/>
   </p:transition>
   <p:timing>
     <p:tnLst>
       <p:par>
-        <p:cTn xmlns:p14="http://schemas.microsoft.com/office/powerpoint/2010/main" id="1" dur="indefinite" restart="never" nodeType="tmRoot"/>
+        <p:cTn id="1" dur="indefinite" restart="never" nodeType="tmRoot"/>
       </p:par>
     </p:tnLst>
   </p:timing>
@@ -9898,13 +9917,13 @@
   <p:clrMapOvr>
     <a:masterClrMapping/>
   </p:clrMapOvr>
-  <p:transition xmlns:p14="http://schemas.microsoft.com/office/powerpoint/2010/main" spd="med">
+  <p:transition spd="med">
     <p:fade/>
   </p:transition>
   <p:timing>
     <p:tnLst>
       <p:par>
-        <p:cTn xmlns:p14="http://schemas.microsoft.com/office/powerpoint/2010/main" id="1" dur="indefinite" restart="never" nodeType="tmRoot"/>
+        <p:cTn id="1" dur="indefinite" restart="never" nodeType="tmRoot"/>
       </p:par>
     </p:tnLst>
   </p:timing>
@@ -10052,13 +10071,13 @@
   <p:clrMapOvr>
     <a:masterClrMapping/>
   </p:clrMapOvr>
-  <p:transition xmlns:p14="http://schemas.microsoft.com/office/powerpoint/2010/main" spd="med">
+  <p:transition spd="med">
     <p:fade/>
   </p:transition>
   <p:timing>
     <p:tnLst>
       <p:par>
-        <p:cTn xmlns:p14="http://schemas.microsoft.com/office/powerpoint/2010/main" id="1" dur="indefinite" restart="never" nodeType="tmRoot"/>
+        <p:cTn id="1" dur="indefinite" restart="never" nodeType="tmRoot"/>
       </p:par>
     </p:tnLst>
   </p:timing>
@@ -10145,11 +10164,7 @@
           <a:p>
             <a:r>
               <a:rPr lang="en-US" dirty="0" smtClean="0"/>
-              <a:t>Move </a:t>
-            </a:r>
-            <a:r>
-              <a:rPr lang="en-US" dirty="0" smtClean="0"/>
-              <a:t>into the Cookbook Directory</a:t>
+              <a:t>Move into the Cookbook Directory</a:t>
             </a:r>
             <a:endParaRPr lang="en-US" dirty="0"/>
           </a:p>
@@ -10165,9 +10180,16 @@
   <p:clrMapOvr>
     <a:masterClrMapping/>
   </p:clrMapOvr>
-  <p:transition xmlns:p14="http://schemas.microsoft.com/office/powerpoint/2010/main" spd="med">
+  <p:transition spd="med">
     <p:fade/>
   </p:transition>
+  <p:timing>
+    <p:tnLst>
+      <p:par>
+        <p:cTn id="1" dur="indefinite" restart="never" nodeType="tmRoot"/>
+      </p:par>
+    </p:tnLst>
+  </p:timing>
 </p:sld>
 </file>
 
@@ -10207,15 +10229,7 @@
           <a:p>
             <a:r>
               <a:rPr lang="en-US" sz="4800" dirty="0" smtClean="0"/>
-              <a:t>Remove Settings </a:t>
-            </a:r>
-            <a:r>
-              <a:rPr lang="en-US" sz="4800" dirty="0" smtClean="0"/>
-              <a:t>from </a:t>
-            </a:r>
-            <a:r>
-              <a:rPr lang="en-US" sz="4800" dirty="0" smtClean="0"/>
-              <a:t>the Kitchen Configuration</a:t>
+              <a:t>Remove Settings from the Kitchen Configuration</a:t>
             </a:r>
             <a:endParaRPr lang="en-US" sz="4800" dirty="0"/>
           </a:p>
@@ -10457,9 +10471,16 @@
   <p:clrMapOvr>
     <a:masterClrMapping/>
   </p:clrMapOvr>
-  <p:transition xmlns:p14="http://schemas.microsoft.com/office/powerpoint/2010/main" spd="med">
+  <p:transition spd="med">
     <p:fade/>
   </p:transition>
+  <p:timing>
+    <p:tnLst>
+      <p:par>
+        <p:cTn id="1" dur="indefinite" restart="never" nodeType="tmRoot"/>
+      </p:par>
+    </p:tnLst>
+  </p:timing>
 </p:sld>
 </file>
 
@@ -10742,9 +10763,16 @@
   <p:clrMapOvr>
     <a:masterClrMapping/>
   </p:clrMapOvr>
-  <p:transition xmlns:p14="http://schemas.microsoft.com/office/powerpoint/2010/main" spd="med">
+  <p:transition spd="med">
     <p:fade/>
   </p:transition>
+  <p:timing>
+    <p:tnLst>
+      <p:par>
+        <p:cTn id="1" dur="indefinite" restart="never" nodeType="tmRoot"/>
+      </p:par>
+    </p:tnLst>
+  </p:timing>
 </p:sld>
 </file>
 
@@ -10905,9 +10933,16 @@
   <p:clrMapOvr>
     <a:masterClrMapping/>
   </p:clrMapOvr>
-  <p:transition xmlns:p14="http://schemas.microsoft.com/office/powerpoint/2010/main" spd="med">
+  <p:transition spd="med">
     <p:fade/>
   </p:transition>
+  <p:timing>
+    <p:tnLst>
+      <p:par>
+        <p:cTn id="1" dur="indefinite" restart="never" nodeType="tmRoot"/>
+      </p:par>
+    </p:tnLst>
+  </p:timing>
 </p:sld>
 </file>
 
@@ -11194,9 +11229,16 @@
   <p:clrMapOvr>
     <a:masterClrMapping/>
   </p:clrMapOvr>
-  <p:transition xmlns:p14="http://schemas.microsoft.com/office/powerpoint/2010/main" spd="med">
+  <p:transition spd="med">
     <p:fade/>
   </p:transition>
+  <p:timing>
+    <p:tnLst>
+      <p:par>
+        <p:cTn id="1" dur="indefinite" restart="never" nodeType="tmRoot"/>
+      </p:par>
+    </p:tnLst>
+  </p:timing>
 </p:sld>
 </file>
 
@@ -11572,9 +11614,16 @@
   <p:clrMapOvr>
     <a:masterClrMapping/>
   </p:clrMapOvr>
-  <p:transition xmlns:p14="http://schemas.microsoft.com/office/powerpoint/2010/main" spd="med">
+  <p:transition spd="med">
     <p:fade/>
   </p:transition>
+  <p:timing>
+    <p:tnLst>
+      <p:par>
+        <p:cTn id="1" dur="indefinite" restart="never" nodeType="tmRoot"/>
+      </p:par>
+    </p:tnLst>
+  </p:timing>
 </p:sld>
 </file>
 
@@ -11850,9 +11899,16 @@
   <p:clrMapOvr>
     <a:masterClrMapping/>
   </p:clrMapOvr>
-  <p:transition xmlns:p14="http://schemas.microsoft.com/office/powerpoint/2010/main" spd="med">
+  <p:transition spd="med">
     <p:fade/>
   </p:transition>
+  <p:timing>
+    <p:tnLst>
+      <p:par>
+        <p:cTn id="1" dur="indefinite" restart="never" nodeType="tmRoot"/>
+      </p:par>
+    </p:tnLst>
+  </p:timing>
 </p:sld>
 </file>
 
@@ -11973,13 +12029,13 @@
   <p:clrMapOvr>
     <a:masterClrMapping/>
   </p:clrMapOvr>
-  <p:transition xmlns:p14="http://schemas.microsoft.com/office/powerpoint/2010/main" spd="med">
+  <p:transition spd="med">
     <p:fade/>
   </p:transition>
   <p:timing>
     <p:tnLst>
       <p:par>
-        <p:cTn xmlns:p14="http://schemas.microsoft.com/office/powerpoint/2010/main" id="1" dur="indefinite" restart="never" nodeType="tmRoot"/>
+        <p:cTn id="1" dur="indefinite" restart="never" nodeType="tmRoot"/>
       </p:par>
     </p:tnLst>
   </p:timing>
@@ -12168,9 +12224,16 @@
   <p:clrMapOvr>
     <a:masterClrMapping/>
   </p:clrMapOvr>
-  <p:transition xmlns:p14="http://schemas.microsoft.com/office/powerpoint/2010/main" spd="med">
+  <p:transition spd="med">
     <p:fade/>
   </p:transition>
+  <p:timing>
+    <p:tnLst>
+      <p:par>
+        <p:cTn id="1" dur="indefinite" restart="never" nodeType="tmRoot"/>
+      </p:par>
+    </p:tnLst>
+  </p:timing>
 </p:sld>
 </file>
 
@@ -12307,13 +12370,13 @@
   <p:clrMapOvr>
     <a:masterClrMapping/>
   </p:clrMapOvr>
-  <p:transition xmlns:p14="http://schemas.microsoft.com/office/powerpoint/2010/main" spd="med">
+  <p:transition spd="med">
     <p:fade/>
   </p:transition>
   <p:timing>
     <p:tnLst>
       <p:par>
-        <p:cTn xmlns:p14="http://schemas.microsoft.com/office/powerpoint/2010/main" id="1" dur="indefinite" restart="never" nodeType="tmRoot"/>
+        <p:cTn id="1" dur="indefinite" restart="never" nodeType="tmRoot"/>
       </p:par>
     </p:tnLst>
   </p:timing>
@@ -12540,13 +12603,13 @@
   <p:clrMapOvr>
     <a:masterClrMapping/>
   </p:clrMapOvr>
-  <p:transition xmlns:p14="http://schemas.microsoft.com/office/powerpoint/2010/main" spd="med">
+  <p:transition spd="med">
     <p:fade/>
   </p:transition>
   <p:timing>
     <p:tnLst>
       <p:par>
-        <p:cTn xmlns:p14="http://schemas.microsoft.com/office/powerpoint/2010/main" id="1" dur="indefinite" restart="never" nodeType="tmRoot"/>
+        <p:cTn id="1" dur="indefinite" restart="never" nodeType="tmRoot"/>
       </p:par>
     </p:tnLst>
   </p:timing>
@@ -12656,13 +12719,13 @@
   <p:clrMapOvr>
     <a:masterClrMapping/>
   </p:clrMapOvr>
-  <p:transition xmlns:p14="http://schemas.microsoft.com/office/powerpoint/2010/main" spd="med">
+  <p:transition spd="med">
     <p:fade/>
   </p:transition>
   <p:timing>
     <p:tnLst>
       <p:par>
-        <p:cTn xmlns:p14="http://schemas.microsoft.com/office/powerpoint/2010/main" id="1" dur="indefinite" restart="never" nodeType="tmRoot"/>
+        <p:cTn id="1" dur="indefinite" restart="never" nodeType="tmRoot"/>
       </p:par>
     </p:tnLst>
   </p:timing>
@@ -12810,13 +12873,13 @@
   <p:clrMapOvr>
     <a:masterClrMapping/>
   </p:clrMapOvr>
-  <p:transition xmlns:p14="http://schemas.microsoft.com/office/powerpoint/2010/main" spd="med">
+  <p:transition spd="med">
     <p:fade/>
   </p:transition>
   <p:timing>
     <p:tnLst>
       <p:par>
-        <p:cTn xmlns:p14="http://schemas.microsoft.com/office/powerpoint/2010/main" id="1" dur="indefinite" restart="never" nodeType="tmRoot"/>
+        <p:cTn id="1" dur="indefinite" restart="never" nodeType="tmRoot"/>
       </p:par>
     </p:tnLst>
   </p:timing>
@@ -13030,9 +13093,16 @@
   <p:clrMapOvr>
     <a:masterClrMapping/>
   </p:clrMapOvr>
-  <p:transition xmlns:p14="http://schemas.microsoft.com/office/powerpoint/2010/main" spd="med">
+  <p:transition spd="med">
     <p:fade/>
   </p:transition>
+  <p:timing>
+    <p:tnLst>
+      <p:par>
+        <p:cTn id="1" dur="indefinite" restart="never" nodeType="tmRoot"/>
+      </p:par>
+    </p:tnLst>
+  </p:timing>
 </p:sld>
 </file>
 
@@ -13177,13 +13247,13 @@
   <p:clrMapOvr>
     <a:masterClrMapping/>
   </p:clrMapOvr>
-  <p:transition xmlns:p14="http://schemas.microsoft.com/office/powerpoint/2010/main" spd="med">
+  <p:transition spd="med">
     <p:fade/>
   </p:transition>
   <p:timing>
     <p:tnLst>
       <p:par>
-        <p:cTn xmlns:p14="http://schemas.microsoft.com/office/powerpoint/2010/main" id="1" dur="indefinite" restart="never" nodeType="tmRoot"/>
+        <p:cTn id="1" dur="indefinite" restart="never" nodeType="tmRoot"/>
       </p:par>
     </p:tnLst>
   </p:timing>
@@ -13427,13 +13497,13 @@
   <p:clrMapOvr>
     <a:masterClrMapping/>
   </p:clrMapOvr>
-  <p:transition xmlns:p14="http://schemas.microsoft.com/office/powerpoint/2010/main" spd="med">
+  <p:transition spd="med">
     <p:fade/>
   </p:transition>
   <p:timing>
     <p:tnLst>
       <p:par>
-        <p:cTn xmlns:p14="http://schemas.microsoft.com/office/powerpoint/2010/main" id="1" dur="indefinite" restart="never" nodeType="tmRoot"/>
+        <p:cTn id="1" dur="indefinite" restart="never" nodeType="tmRoot"/>
       </p:par>
     </p:tnLst>
   </p:timing>
@@ -13602,13 +13672,13 @@
   <p:clrMapOvr>
     <a:masterClrMapping/>
   </p:clrMapOvr>
-  <p:transition xmlns:p14="http://schemas.microsoft.com/office/powerpoint/2010/main" spd="med">
+  <p:transition spd="med">
     <p:fade/>
   </p:transition>
   <p:timing>
     <p:tnLst>
       <p:par>
-        <p:cTn xmlns:p14="http://schemas.microsoft.com/office/powerpoint/2010/main" id="1" dur="indefinite" restart="never" nodeType="tmRoot"/>
+        <p:cTn id="1" dur="indefinite" restart="never" nodeType="tmRoot"/>
       </p:par>
     </p:tnLst>
   </p:timing>
@@ -13689,9 +13759,16 @@
   <p:clrMapOvr>
     <a:masterClrMapping/>
   </p:clrMapOvr>
-  <p:transition xmlns:p14="http://schemas.microsoft.com/office/powerpoint/2010/main" spd="med">
+  <p:transition spd="med">
     <p:fade/>
   </p:transition>
+  <p:timing>
+    <p:tnLst>
+      <p:par>
+        <p:cTn id="1" dur="indefinite" restart="never" nodeType="tmRoot"/>
+      </p:par>
+    </p:tnLst>
+  </p:timing>
 </p:sld>
 </file>
 
@@ -13837,13 +13914,13 @@
   <p:clrMapOvr>
     <a:masterClrMapping/>
   </p:clrMapOvr>
-  <p:transition xmlns:p14="http://schemas.microsoft.com/office/powerpoint/2010/main" spd="med">
+  <p:transition spd="med">
     <p:fade/>
   </p:transition>
   <p:timing>
     <p:tnLst>
       <p:par>
-        <p:cTn xmlns:p14="http://schemas.microsoft.com/office/powerpoint/2010/main" id="1" dur="indefinite" restart="never" nodeType="tmRoot"/>
+        <p:cTn id="1" dur="indefinite" restart="never" nodeType="tmRoot"/>
       </p:par>
     </p:tnLst>
   </p:timing>
@@ -13925,9 +14002,16 @@
   <p:clrMapOvr>
     <a:masterClrMapping/>
   </p:clrMapOvr>
-  <p:transition xmlns:p14="http://schemas.microsoft.com/office/powerpoint/2010/main" spd="med">
+  <p:transition spd="med">
     <p:fade/>
   </p:transition>
+  <p:timing>
+    <p:tnLst>
+      <p:par>
+        <p:cTn id="1" dur="indefinite" restart="never" nodeType="tmRoot"/>
+      </p:par>
+    </p:tnLst>
+  </p:timing>
 </p:sld>
 </file>
 
@@ -14155,13 +14239,13 @@
   <p:clrMapOvr>
     <a:masterClrMapping/>
   </p:clrMapOvr>
-  <p:transition xmlns:p14="http://schemas.microsoft.com/office/powerpoint/2010/main" spd="med">
+  <p:transition spd="med">
     <p:fade/>
   </p:transition>
   <p:timing>
     <p:tnLst>
       <p:par>
-        <p:cTn xmlns:p14="http://schemas.microsoft.com/office/powerpoint/2010/main" id="1" dur="indefinite" restart="never" nodeType="tmRoot"/>
+        <p:cTn id="1" dur="indefinite" restart="never" nodeType="tmRoot"/>
       </p:par>
     </p:tnLst>
   </p:timing>
@@ -14341,13 +14425,13 @@
   <p:clrMapOvr>
     <a:masterClrMapping/>
   </p:clrMapOvr>
-  <p:transition xmlns:p14="http://schemas.microsoft.com/office/powerpoint/2010/main" spd="med">
+  <p:transition spd="med">
     <p:fade/>
   </p:transition>
   <p:timing>
     <p:tnLst>
       <p:par>
-        <p:cTn xmlns:p14="http://schemas.microsoft.com/office/powerpoint/2010/main" id="1" dur="indefinite" restart="never" nodeType="tmRoot"/>
+        <p:cTn id="1" dur="indefinite" restart="never" nodeType="tmRoot"/>
       </p:par>
     </p:tnLst>
   </p:timing>
@@ -14495,9 +14579,16 @@
   <p:clrMapOvr>
     <a:masterClrMapping/>
   </p:clrMapOvr>
-  <p:transition xmlns:p14="http://schemas.microsoft.com/office/powerpoint/2010/main" spd="med">
+  <p:transition spd="med">
     <p:fade/>
   </p:transition>
+  <p:timing>
+    <p:tnLst>
+      <p:par>
+        <p:cTn id="1" dur="indefinite" restart="never" nodeType="tmRoot"/>
+      </p:par>
+    </p:tnLst>
+  </p:timing>
 </p:sld>
 </file>
 
@@ -14593,9 +14684,16 @@
   <p:clrMapOvr>
     <a:masterClrMapping/>
   </p:clrMapOvr>
-  <p:transition xmlns:p14="http://schemas.microsoft.com/office/powerpoint/2010/main" spd="med">
+  <p:transition spd="med">
     <p:fade/>
   </p:transition>
+  <p:timing>
+    <p:tnLst>
+      <p:par>
+        <p:cTn id="1" dur="indefinite" restart="never" nodeType="tmRoot"/>
+      </p:par>
+    </p:tnLst>
+  </p:timing>
 </p:sld>
 </file>
 
@@ -14674,9 +14772,16 @@
   <p:clrMapOvr>
     <a:masterClrMapping/>
   </p:clrMapOvr>
-  <p:transition xmlns:p14="http://schemas.microsoft.com/office/powerpoint/2010/main" spd="med">
+  <p:transition spd="med">
     <p:fade/>
   </p:transition>
+  <p:timing>
+    <p:tnLst>
+      <p:par>
+        <p:cTn id="1" dur="indefinite" restart="never" nodeType="tmRoot"/>
+      </p:par>
+    </p:tnLst>
+  </p:timing>
 </p:sld>
 </file>
 
@@ -14707,7 +14812,7 @@
   <p:clrMapOvr>
     <a:masterClrMapping/>
   </p:clrMapOvr>
-  <p:transition xmlns:p14="http://schemas.microsoft.com/office/powerpoint/2010/main" spd="med">
+  <p:transition spd="med">
     <p:fade/>
   </p:transition>
 </p:sld>
@@ -14807,13 +14912,13 @@
   <p:clrMapOvr>
     <a:masterClrMapping/>
   </p:clrMapOvr>
-  <p:transition xmlns:p14="http://schemas.microsoft.com/office/powerpoint/2010/main" spd="med">
+  <p:transition spd="med">
     <p:fade/>
   </p:transition>
   <p:timing>
     <p:tnLst>
       <p:par>
-        <p:cTn xmlns:p14="http://schemas.microsoft.com/office/powerpoint/2010/main" id="1" dur="indefinite" restart="never" nodeType="tmRoot"/>
+        <p:cTn id="1" dur="indefinite" restart="never" nodeType="tmRoot"/>
       </p:par>
     </p:tnLst>
   </p:timing>
@@ -15014,13 +15119,13 @@
   <p:clrMapOvr>
     <a:masterClrMapping/>
   </p:clrMapOvr>
-  <p:transition xmlns:p14="http://schemas.microsoft.com/office/powerpoint/2010/main" spd="med">
+  <p:transition spd="med">
     <p:fade/>
   </p:transition>
   <p:timing>
     <p:tnLst>
       <p:par>
-        <p:cTn xmlns:p14="http://schemas.microsoft.com/office/powerpoint/2010/main" id="1" dur="indefinite" restart="never" nodeType="tmRoot"/>
+        <p:cTn id="1" dur="indefinite" restart="never" nodeType="tmRoot"/>
       </p:par>
     </p:tnLst>
   </p:timing>
@@ -15274,13 +15379,13 @@
   <p:clrMapOvr>
     <a:masterClrMapping/>
   </p:clrMapOvr>
-  <p:transition xmlns:p14="http://schemas.microsoft.com/office/powerpoint/2010/main" spd="med">
+  <p:transition spd="med">
     <p:fade/>
   </p:transition>
   <p:timing>
     <p:tnLst>
       <p:par>
-        <p:cTn xmlns:p14="http://schemas.microsoft.com/office/powerpoint/2010/main" id="1" dur="indefinite" restart="never" nodeType="tmRoot"/>
+        <p:cTn id="1" dur="indefinite" restart="never" nodeType="tmRoot"/>
       </p:par>
     </p:tnLst>
   </p:timing>
@@ -15421,13 +15526,13 @@
   <p:clrMapOvr>
     <a:masterClrMapping/>
   </p:clrMapOvr>
-  <p:transition xmlns:p14="http://schemas.microsoft.com/office/powerpoint/2010/main" spd="med">
+  <p:transition spd="med">
     <p:fade/>
   </p:transition>
   <p:timing>
     <p:tnLst>
       <p:par>
-        <p:cTn xmlns:p14="http://schemas.microsoft.com/office/powerpoint/2010/main" id="1" dur="indefinite" restart="never" nodeType="tmRoot"/>
+        <p:cTn id="1" dur="indefinite" restart="never" nodeType="tmRoot"/>
       </p:par>
     </p:tnLst>
   </p:timing>
@@ -15628,13 +15733,13 @@
   <p:clrMapOvr>
     <a:masterClrMapping/>
   </p:clrMapOvr>
-  <p:transition xmlns:p14="http://schemas.microsoft.com/office/powerpoint/2010/main" spd="med">
+  <p:transition spd="med">
     <p:fade/>
   </p:transition>
   <p:timing>
     <p:tnLst>
       <p:par>
-        <p:cTn xmlns:p14="http://schemas.microsoft.com/office/powerpoint/2010/main" id="1" dur="indefinite" restart="never" nodeType="tmRoot"/>
+        <p:cTn id="1" dur="indefinite" restart="never" nodeType="tmRoot"/>
       </p:par>
     </p:tnLst>
   </p:timing>
@@ -15782,13 +15887,13 @@
   <p:clrMapOvr>
     <a:masterClrMapping/>
   </p:clrMapOvr>
-  <p:transition xmlns:p14="http://schemas.microsoft.com/office/powerpoint/2010/main" spd="med">
+  <p:transition spd="med">
     <p:fade/>
   </p:transition>
   <p:timing>
     <p:tnLst>
       <p:par>
-        <p:cTn xmlns:p14="http://schemas.microsoft.com/office/powerpoint/2010/main" id="1" dur="indefinite" restart="never" nodeType="tmRoot"/>
+        <p:cTn id="1" dur="indefinite" restart="never" nodeType="tmRoot"/>
       </p:par>
     </p:tnLst>
   </p:timing>
@@ -16171,7 +16276,7 @@
   <a:extraClrSchemeLst/>
   <a:extLst>
     <a:ext uri="{05A4C25C-085E-4340-85A3-A5531E510DB2}">
-      <thm15:themeFamily xmlns="" xmlns:thm15="http://schemas.microsoft.com/office/thememl/2012/main" name="Chef-TemplateComps_v09-16x9-Light.potx" id="{078CEFDB-FA7A-4E36-9964-13EF367585CB}" vid="{8B87B0F3-7308-43D5-8388-E1B49EA02652}"/>
+      <thm15:themeFamily xmlns:thm15="http://schemas.microsoft.com/office/thememl/2012/main" name="Chef-TemplateComps_v09-16x9-Light.potx" id="{078CEFDB-FA7A-4E36-9964-13EF367585CB}" vid="{8B87B0F3-7308-43D5-8388-E1B49EA02652}"/>
     </a:ext>
   </a:extLst>
 </a:theme>
@@ -16553,7 +16658,7 @@
   <a:extraClrSchemeLst/>
   <a:extLst>
     <a:ext uri="{05A4C25C-085E-4340-85A3-A5531E510DB2}">
-      <thm15:themeFamily xmlns="" xmlns:thm15="http://schemas.microsoft.com/office/thememl/2012/main" name="Chef-TemplateComps_v09-16x9-Light.potx" id="{078CEFDB-FA7A-4E36-9964-13EF367585CB}" vid="{8B87B0F3-7308-43D5-8388-E1B49EA02652}"/>
+      <thm15:themeFamily xmlns:thm15="http://schemas.microsoft.com/office/thememl/2012/main" name="Chef-TemplateComps_v09-16x9-Light.potx" id="{078CEFDB-FA7A-4E36-9964-13EF367585CB}" vid="{8B87B0F3-7308-43D5-8388-E1B49EA02652}"/>
     </a:ext>
   </a:extLst>
 </a:theme>

</xml_diff>